<commit_message>
Final set for 04.09.23
</commit_message>
<xml_diff>
--- a/Lending_club_caseStudy.pptx
+++ b/Lending_club_caseStudy.pptx
@@ -18,19 +18,20 @@
     <p:sldId id="264" r:id="rId12"/>
     <p:sldId id="265" r:id="rId13"/>
     <p:sldId id="276" r:id="rId14"/>
-    <p:sldId id="283" r:id="rId15"/>
-    <p:sldId id="266" r:id="rId16"/>
-    <p:sldId id="278" r:id="rId17"/>
-    <p:sldId id="267" r:id="rId18"/>
-    <p:sldId id="277" r:id="rId19"/>
-    <p:sldId id="268" r:id="rId20"/>
-    <p:sldId id="269" r:id="rId21"/>
-    <p:sldId id="270" r:id="rId22"/>
-    <p:sldId id="279" r:id="rId23"/>
-    <p:sldId id="271" r:id="rId24"/>
-    <p:sldId id="272" r:id="rId25"/>
-    <p:sldId id="284" r:id="rId26"/>
-    <p:sldId id="285" r:id="rId27"/>
+    <p:sldId id="286" r:id="rId15"/>
+    <p:sldId id="283" r:id="rId16"/>
+    <p:sldId id="266" r:id="rId17"/>
+    <p:sldId id="278" r:id="rId18"/>
+    <p:sldId id="267" r:id="rId19"/>
+    <p:sldId id="277" r:id="rId20"/>
+    <p:sldId id="268" r:id="rId21"/>
+    <p:sldId id="269" r:id="rId22"/>
+    <p:sldId id="270" r:id="rId23"/>
+    <p:sldId id="279" r:id="rId24"/>
+    <p:sldId id="271" r:id="rId25"/>
+    <p:sldId id="272" r:id="rId26"/>
+    <p:sldId id="284" r:id="rId27"/>
+    <p:sldId id="285" r:id="rId28"/>
   </p:sldIdLst>
   <p:sldSz cx="12192000" cy="6858000"/>
   <p:notesSz cx="6858000" cy="9144000"/>
@@ -3440,15 +3441,7 @@
           <a:p>
             <a:r>
               <a:rPr lang="en-US" dirty="0" smtClean="0"/>
-              <a:t>This is </a:t>
-            </a:r>
-            <a:r>
-              <a:rPr lang="en-US" dirty="0" smtClean="0"/>
-              <a:t>customer attribute </a:t>
-            </a:r>
-            <a:r>
-              <a:rPr lang="en-US" dirty="0" smtClean="0"/>
-              <a:t>influencing tendency of default </a:t>
+              <a:t>This is customer attribute influencing tendency of default </a:t>
             </a:r>
             <a:endParaRPr lang="en-US" dirty="0"/>
           </a:p>
@@ -3662,8 +3655,12 @@
           <a:lstStyle/>
           <a:p>
             <a:r>
+              <a:rPr lang="en-US" b="1" dirty="0" smtClean="0"/>
+              <a:t>Average Pay </a:t>
+            </a:r>
+            <a:r>
               <a:rPr lang="en-US" b="1" dirty="0"/>
-              <a:t>Pay ratio </a:t>
+              <a:t>ratio </a:t>
             </a:r>
             <a:r>
               <a:rPr lang="en-US" b="1" dirty="0" err="1"/>
@@ -3715,7 +3712,7 @@
         <p:spPr>
           <a:xfrm>
             <a:off x="7500938" y="1943100"/>
-            <a:ext cx="4414837" cy="2862322"/>
+            <a:ext cx="4414837" cy="3416320"/>
           </a:xfrm>
           <a:prstGeom prst="rect">
             <a:avLst/>
@@ -3754,6 +3751,13 @@
             </a:r>
           </a:p>
           <a:p>
+            <a:endParaRPr lang="en-US" dirty="0" smtClean="0"/>
+          </a:p>
+          <a:p>
+            <a:r>
+              <a:rPr lang="en-US" dirty="0" smtClean="0"/>
+              <a:t>Loans with pay ratio &gt; 1.275 are likely to default</a:t>
+            </a:r>
             <a:endParaRPr lang="en-US" dirty="0"/>
           </a:p>
           <a:p>
@@ -3826,37 +3830,56 @@
       </p:grpSpPr>
       <p:sp>
         <p:nvSpPr>
-          <p:cNvPr id="2" name="Title 1"/>
-          <p:cNvSpPr>
-            <a:spLocks noGrp="1"/>
-          </p:cNvSpPr>
-          <p:nvPr>
-            <p:ph type="title"/>
-          </p:nvPr>
-        </p:nvSpPr>
-        <p:spPr>
-          <a:xfrm>
-            <a:off x="838200" y="2422525"/>
-            <a:ext cx="10515600" cy="1325563"/>
-          </a:xfrm>
-        </p:spPr>
-        <p:txBody>
-          <a:bodyPr/>
-          <a:lstStyle/>
-          <a:p>
-            <a:pPr algn="ctr"/>
-            <a:r>
-              <a:rPr lang="en-US" b="1" dirty="0" smtClean="0"/>
-              <a:t>Bivariate Analysis</a:t>
-            </a:r>
-            <a:endParaRPr lang="en-US" b="1" dirty="0"/>
+          <p:cNvPr id="3" name="Content Placeholder 2"/>
+          <p:cNvSpPr>
+            <a:spLocks noGrp="1"/>
+          </p:cNvSpPr>
+          <p:nvPr>
+            <p:ph idx="1"/>
+          </p:nvPr>
+        </p:nvSpPr>
+        <p:spPr>
+          <a:xfrm>
+            <a:off x="481012" y="1497012"/>
+            <a:ext cx="10515600" cy="4351338"/>
+          </a:xfrm>
+        </p:spPr>
+        <p:txBody>
+          <a:bodyPr/>
+          <a:lstStyle/>
+          <a:p>
+            <a:r>
+              <a:rPr lang="en-US" dirty="0" smtClean="0"/>
+              <a:t>In above figures, the average values for currently active loans are higher than charged off and fully paid loans. This is because:</a:t>
+            </a:r>
+          </a:p>
+          <a:p>
+            <a:pPr lvl="1"/>
+            <a:r>
+              <a:rPr lang="en-US" dirty="0" smtClean="0"/>
+              <a:t>Currently active loans are the least in number compared to others, thus average values goes up.</a:t>
+            </a:r>
+          </a:p>
+          <a:p>
+            <a:pPr lvl="1"/>
+            <a:r>
+              <a:rPr lang="en-US" dirty="0" smtClean="0"/>
+              <a:t>All of them are higher term loans (60 months) with high loan amounts</a:t>
+            </a:r>
+          </a:p>
+          <a:p>
+            <a:pPr lvl="1"/>
+            <a:r>
+              <a:rPr lang="en-US" dirty="0" smtClean="0"/>
+              <a:t>This also represents good borrowers</a:t>
+            </a:r>
           </a:p>
         </p:txBody>
       </p:sp>
     </p:spTree>
     <p:extLst>
       <p:ext uri="{BB962C8B-B14F-4D97-AF65-F5344CB8AC3E}">
-        <p14:creationId xmlns:p14="http://schemas.microsoft.com/office/powerpoint/2010/main" val="979550969"/>
+        <p14:creationId xmlns:p14="http://schemas.microsoft.com/office/powerpoint/2010/main" val="1240530132"/>
       </p:ext>
     </p:extLst>
   </p:cSld>
@@ -3893,129 +3916,29 @@
             <p:ph type="title"/>
           </p:nvPr>
         </p:nvSpPr>
-        <p:spPr/>
-        <p:txBody>
-          <a:bodyPr>
-            <a:normAutofit/>
-          </a:bodyPr>
-          <a:lstStyle/>
-          <a:p>
-            <a:r>
-              <a:rPr lang="en-US" b="1" dirty="0"/>
-              <a:t>Top 10 defaulting </a:t>
-            </a:r>
+        <p:spPr>
+          <a:xfrm>
+            <a:off x="838200" y="2422525"/>
+            <a:ext cx="10515600" cy="1325563"/>
+          </a:xfrm>
+        </p:spPr>
+        <p:txBody>
+          <a:bodyPr/>
+          <a:lstStyle/>
+          <a:p>
+            <a:pPr algn="ctr"/>
             <a:r>
               <a:rPr lang="en-US" b="1" dirty="0" smtClean="0"/>
-              <a:t>‘purpose’ of loans</a:t>
-            </a:r>
-            <a:r>
-              <a:rPr lang="en-US" b="1" dirty="0"/>
-              <a:t/>
-            </a:r>
-            <a:br>
-              <a:rPr lang="en-US" b="1" dirty="0"/>
-            </a:br>
+              <a:t>Bivariate Analysis</a:t>
+            </a:r>
             <a:endParaRPr lang="en-US" b="1" dirty="0"/>
-          </a:p>
-        </p:txBody>
-      </p:sp>
-      <p:sp>
-        <p:nvSpPr>
-          <p:cNvPr id="5" name="TextBox 4"/>
-          <p:cNvSpPr txBox="1"/>
-          <p:nvPr/>
-        </p:nvSpPr>
-        <p:spPr>
-          <a:xfrm>
-            <a:off x="7072313" y="1828800"/>
-            <a:ext cx="3943350" cy="1754326"/>
-          </a:xfrm>
-          <a:prstGeom prst="rect">
-            <a:avLst/>
-          </a:prstGeom>
-          <a:noFill/>
-        </p:spPr>
-        <p:txBody>
-          <a:bodyPr wrap="square" rtlCol="0">
-            <a:spAutoFit/>
-          </a:bodyPr>
-          <a:lstStyle/>
-          <a:p>
-            <a:r>
-              <a:rPr lang="en-US" dirty="0" smtClean="0"/>
-              <a:t>Data set is segmented based on loan status and grouped based on the loan purpose.</a:t>
-            </a:r>
-          </a:p>
-          <a:p>
-            <a:endParaRPr lang="en-US" dirty="0"/>
-          </a:p>
-          <a:p>
-            <a:r>
-              <a:rPr lang="en-US" dirty="0" smtClean="0"/>
-              <a:t>Top 10 purpose covers more than 80% of total defaulters</a:t>
-            </a:r>
-            <a:endParaRPr lang="en-US" dirty="0"/>
-          </a:p>
-        </p:txBody>
-      </p:sp>
-      <p:pic>
-        <p:nvPicPr>
-          <p:cNvPr id="7" name="Picture 6"/>
-          <p:cNvPicPr>
-            <a:picLocks noChangeAspect="1"/>
-          </p:cNvPicPr>
-          <p:nvPr/>
-        </p:nvPicPr>
-        <p:blipFill>
-          <a:blip r:embed="rId2"/>
-          <a:stretch>
-            <a:fillRect/>
-          </a:stretch>
-        </p:blipFill>
-        <p:spPr>
-          <a:xfrm>
-            <a:off x="352425" y="1166813"/>
-            <a:ext cx="5524500" cy="5505450"/>
-          </a:xfrm>
-          <a:prstGeom prst="rect">
-            <a:avLst/>
-          </a:prstGeom>
-        </p:spPr>
-      </p:pic>
-      <p:sp>
-        <p:nvSpPr>
-          <p:cNvPr id="8" name="TextBox 7"/>
-          <p:cNvSpPr txBox="1"/>
-          <p:nvPr/>
-        </p:nvSpPr>
-        <p:spPr>
-          <a:xfrm>
-            <a:off x="6496050" y="6029325"/>
-            <a:ext cx="5524500" cy="369332"/>
-          </a:xfrm>
-          <a:prstGeom prst="rect">
-            <a:avLst/>
-          </a:prstGeom>
-          <a:noFill/>
-        </p:spPr>
-        <p:txBody>
-          <a:bodyPr wrap="square" rtlCol="0">
-            <a:spAutoFit/>
-          </a:bodyPr>
-          <a:lstStyle/>
-          <a:p>
-            <a:r>
-              <a:rPr lang="en-US" dirty="0" smtClean="0"/>
-              <a:t>This is loan attribute influencing tendency of default </a:t>
-            </a:r>
-            <a:endParaRPr lang="en-US" dirty="0"/>
           </a:p>
         </p:txBody>
       </p:sp>
     </p:spTree>
     <p:extLst>
       <p:ext uri="{BB962C8B-B14F-4D97-AF65-F5344CB8AC3E}">
-        <p14:creationId xmlns:p14="http://schemas.microsoft.com/office/powerpoint/2010/main" val="3275595886"/>
+        <p14:creationId xmlns:p14="http://schemas.microsoft.com/office/powerpoint/2010/main" val="979550969"/>
       </p:ext>
     </p:extLst>
   </p:cSld>
@@ -4054,20 +3977,72 @@
         </p:nvSpPr>
         <p:spPr/>
         <p:txBody>
-          <a:bodyPr/>
-          <a:lstStyle/>
-          <a:p>
+          <a:bodyPr>
+            <a:normAutofit/>
+          </a:bodyPr>
+          <a:lstStyle/>
+          <a:p>
+            <a:r>
+              <a:rPr lang="en-US" b="1" dirty="0"/>
+              <a:t>Top 10 defaulting </a:t>
+            </a:r>
             <a:r>
               <a:rPr lang="en-US" b="1" dirty="0" smtClean="0"/>
-              <a:t>Home ownership of borrowers across loan portfolio</a:t>
-            </a:r>
+              <a:t>‘purpose’ of loans</a:t>
+            </a:r>
+            <a:r>
+              <a:rPr lang="en-US" b="1" dirty="0"/>
+              <a:t/>
+            </a:r>
+            <a:br>
+              <a:rPr lang="en-US" b="1" dirty="0"/>
+            </a:br>
             <a:endParaRPr lang="en-US" b="1" dirty="0"/>
+          </a:p>
+        </p:txBody>
+      </p:sp>
+      <p:sp>
+        <p:nvSpPr>
+          <p:cNvPr id="5" name="TextBox 4"/>
+          <p:cNvSpPr txBox="1"/>
+          <p:nvPr/>
+        </p:nvSpPr>
+        <p:spPr>
+          <a:xfrm>
+            <a:off x="7072313" y="1828800"/>
+            <a:ext cx="3943350" cy="1754326"/>
+          </a:xfrm>
+          <a:prstGeom prst="rect">
+            <a:avLst/>
+          </a:prstGeom>
+          <a:noFill/>
+        </p:spPr>
+        <p:txBody>
+          <a:bodyPr wrap="square" rtlCol="0">
+            <a:spAutoFit/>
+          </a:bodyPr>
+          <a:lstStyle/>
+          <a:p>
+            <a:r>
+              <a:rPr lang="en-US" dirty="0" smtClean="0"/>
+              <a:t>Data set is segmented based on loan status and grouped based on the loan purpose.</a:t>
+            </a:r>
+          </a:p>
+          <a:p>
+            <a:endParaRPr lang="en-US" dirty="0"/>
+          </a:p>
+          <a:p>
+            <a:r>
+              <a:rPr lang="en-US" dirty="0" smtClean="0"/>
+              <a:t>Top 10 purpose covers more than 80% of total defaulters</a:t>
+            </a:r>
+            <a:endParaRPr lang="en-US" dirty="0"/>
           </a:p>
         </p:txBody>
       </p:sp>
       <p:pic>
         <p:nvPicPr>
-          <p:cNvPr id="4" name="Picture 3"/>
+          <p:cNvPr id="7" name="Picture 6"/>
           <p:cNvPicPr>
             <a:picLocks noChangeAspect="1"/>
           </p:cNvPicPr>
@@ -4081,18 +4056,48 @@
         </p:blipFill>
         <p:spPr>
           <a:xfrm>
-            <a:off x="995363" y="2173287"/>
-            <a:ext cx="9744075" cy="3724275"/>
+            <a:off x="352425" y="1166813"/>
+            <a:ext cx="5524500" cy="5505450"/>
           </a:xfrm>
           <a:prstGeom prst="rect">
             <a:avLst/>
           </a:prstGeom>
         </p:spPr>
       </p:pic>
+      <p:sp>
+        <p:nvSpPr>
+          <p:cNvPr id="8" name="TextBox 7"/>
+          <p:cNvSpPr txBox="1"/>
+          <p:nvPr/>
+        </p:nvSpPr>
+        <p:spPr>
+          <a:xfrm>
+            <a:off x="6496050" y="6029325"/>
+            <a:ext cx="5524500" cy="369332"/>
+          </a:xfrm>
+          <a:prstGeom prst="rect">
+            <a:avLst/>
+          </a:prstGeom>
+          <a:noFill/>
+        </p:spPr>
+        <p:txBody>
+          <a:bodyPr wrap="square" rtlCol="0">
+            <a:spAutoFit/>
+          </a:bodyPr>
+          <a:lstStyle/>
+          <a:p>
+            <a:r>
+              <a:rPr lang="en-US" dirty="0" smtClean="0"/>
+              <a:t>This is loan attribute influencing tendency of default </a:t>
+            </a:r>
+            <a:endParaRPr lang="en-US" dirty="0"/>
+          </a:p>
+        </p:txBody>
+      </p:sp>
     </p:spTree>
     <p:extLst>
       <p:ext uri="{BB962C8B-B14F-4D97-AF65-F5344CB8AC3E}">
-        <p14:creationId xmlns:p14="http://schemas.microsoft.com/office/powerpoint/2010/main" val="189875396"/>
+        <p14:creationId xmlns:p14="http://schemas.microsoft.com/office/powerpoint/2010/main" val="3275595886"/>
       </p:ext>
     </p:extLst>
   </p:cSld>
@@ -4135,25 +4140,20 @@
           <a:lstStyle/>
           <a:p>
             <a:r>
-              <a:rPr lang="en-US" b="1" dirty="0"/>
-              <a:t>Home ownership of Defaulters</a:t>
-            </a:r>
-            <a:br>
-              <a:rPr lang="en-US" b="1" dirty="0"/>
-            </a:br>
+              <a:rPr lang="en-US" b="1" dirty="0" smtClean="0"/>
+              <a:t>Home ownership of borrowers across loan portfolio</a:t>
+            </a:r>
             <a:endParaRPr lang="en-US" b="1" dirty="0"/>
           </a:p>
         </p:txBody>
       </p:sp>
       <p:pic>
         <p:nvPicPr>
-          <p:cNvPr id="4" name="Content Placeholder 3"/>
+          <p:cNvPr id="4" name="Picture 3"/>
           <p:cNvPicPr>
-            <a:picLocks noGrp="1" noChangeAspect="1"/>
+            <a:picLocks noChangeAspect="1"/>
           </p:cNvPicPr>
-          <p:nvPr>
-            <p:ph idx="1"/>
-          </p:nvPr>
+          <p:nvPr/>
         </p:nvPicPr>
         <p:blipFill>
           <a:blip r:embed="rId2"/>
@@ -4163,87 +4163,18 @@
         </p:blipFill>
         <p:spPr>
           <a:xfrm>
-            <a:off x="838200" y="1572419"/>
-            <a:ext cx="5524500" cy="4314825"/>
+            <a:off x="995363" y="2173287"/>
+            <a:ext cx="9744075" cy="3724275"/>
           </a:xfrm>
           <a:prstGeom prst="rect">
             <a:avLst/>
           </a:prstGeom>
         </p:spPr>
       </p:pic>
-      <p:sp>
-        <p:nvSpPr>
-          <p:cNvPr id="5" name="TextBox 4"/>
-          <p:cNvSpPr txBox="1"/>
-          <p:nvPr/>
-        </p:nvSpPr>
-        <p:spPr>
-          <a:xfrm>
-            <a:off x="7072313" y="1828800"/>
-            <a:ext cx="3943350" cy="1754326"/>
-          </a:xfrm>
-          <a:prstGeom prst="rect">
-            <a:avLst/>
-          </a:prstGeom>
-          <a:noFill/>
-        </p:spPr>
-        <p:txBody>
-          <a:bodyPr wrap="square" rtlCol="0">
-            <a:spAutoFit/>
-          </a:bodyPr>
-          <a:lstStyle/>
-          <a:p>
-            <a:r>
-              <a:rPr lang="en-US" dirty="0" smtClean="0"/>
-              <a:t>Data set is segmented based on loan status and grouped based on the type of home ownership</a:t>
-            </a:r>
-          </a:p>
-          <a:p>
-            <a:endParaRPr lang="en-US" dirty="0"/>
-          </a:p>
-          <a:p>
-            <a:r>
-              <a:rPr lang="en-US" dirty="0" smtClean="0"/>
-              <a:t>Largest group of defaulters are either on rent or have their homes mortgaged</a:t>
-            </a:r>
-            <a:endParaRPr lang="en-US" dirty="0"/>
-          </a:p>
-        </p:txBody>
-      </p:sp>
-      <p:sp>
-        <p:nvSpPr>
-          <p:cNvPr id="6" name="TextBox 5"/>
-          <p:cNvSpPr txBox="1"/>
-          <p:nvPr/>
-        </p:nvSpPr>
-        <p:spPr>
-          <a:xfrm>
-            <a:off x="838200" y="6215063"/>
-            <a:ext cx="5524500" cy="369332"/>
-          </a:xfrm>
-          <a:prstGeom prst="rect">
-            <a:avLst/>
-          </a:prstGeom>
-          <a:noFill/>
-        </p:spPr>
-        <p:txBody>
-          <a:bodyPr wrap="square" rtlCol="0">
-            <a:spAutoFit/>
-          </a:bodyPr>
-          <a:lstStyle/>
-          <a:p>
-            <a:r>
-              <a:rPr lang="en-US" dirty="0" smtClean="0"/>
-              <a:t>This is costumer attribute influencing tendency of default </a:t>
-            </a:r>
-            <a:endParaRPr lang="en-US" dirty="0"/>
-          </a:p>
-        </p:txBody>
-      </p:sp>
     </p:spTree>
     <p:extLst>
       <p:ext uri="{BB962C8B-B14F-4D97-AF65-F5344CB8AC3E}">
-        <p14:creationId xmlns:p14="http://schemas.microsoft.com/office/powerpoint/2010/main" val="3759789253"/>
+        <p14:creationId xmlns:p14="http://schemas.microsoft.com/office/powerpoint/2010/main" val="189875396"/>
       </p:ext>
     </p:extLst>
   </p:cSld>
@@ -4286,9 +4217,12 @@
           <a:lstStyle/>
           <a:p>
             <a:r>
-              <a:rPr lang="en-US" b="1" dirty="0" smtClean="0"/>
-              <a:t>Borrower grade distribution across loan portfolio</a:t>
-            </a:r>
+              <a:rPr lang="en-US" b="1" dirty="0"/>
+              <a:t>Home ownership of Defaulters</a:t>
+            </a:r>
+            <a:br>
+              <a:rPr lang="en-US" b="1" dirty="0"/>
+            </a:br>
             <a:endParaRPr lang="en-US" b="1" dirty="0"/>
           </a:p>
         </p:txBody>
@@ -4311,18 +4245,87 @@
         </p:blipFill>
         <p:spPr>
           <a:xfrm>
-            <a:off x="1223962" y="2167731"/>
-            <a:ext cx="9744075" cy="3724275"/>
+            <a:off x="838200" y="1572419"/>
+            <a:ext cx="5524500" cy="4314825"/>
           </a:xfrm>
           <a:prstGeom prst="rect">
             <a:avLst/>
           </a:prstGeom>
         </p:spPr>
       </p:pic>
+      <p:sp>
+        <p:nvSpPr>
+          <p:cNvPr id="5" name="TextBox 4"/>
+          <p:cNvSpPr txBox="1"/>
+          <p:nvPr/>
+        </p:nvSpPr>
+        <p:spPr>
+          <a:xfrm>
+            <a:off x="7072313" y="1828800"/>
+            <a:ext cx="3943350" cy="1754326"/>
+          </a:xfrm>
+          <a:prstGeom prst="rect">
+            <a:avLst/>
+          </a:prstGeom>
+          <a:noFill/>
+        </p:spPr>
+        <p:txBody>
+          <a:bodyPr wrap="square" rtlCol="0">
+            <a:spAutoFit/>
+          </a:bodyPr>
+          <a:lstStyle/>
+          <a:p>
+            <a:r>
+              <a:rPr lang="en-US" dirty="0" smtClean="0"/>
+              <a:t>Data set is segmented based on loan status and grouped based on the type of home ownership</a:t>
+            </a:r>
+          </a:p>
+          <a:p>
+            <a:endParaRPr lang="en-US" dirty="0"/>
+          </a:p>
+          <a:p>
+            <a:r>
+              <a:rPr lang="en-US" dirty="0" smtClean="0"/>
+              <a:t>Largest group of defaulters are either on rent or have their homes mortgaged</a:t>
+            </a:r>
+            <a:endParaRPr lang="en-US" dirty="0"/>
+          </a:p>
+        </p:txBody>
+      </p:sp>
+      <p:sp>
+        <p:nvSpPr>
+          <p:cNvPr id="6" name="TextBox 5"/>
+          <p:cNvSpPr txBox="1"/>
+          <p:nvPr/>
+        </p:nvSpPr>
+        <p:spPr>
+          <a:xfrm>
+            <a:off x="838200" y="6215063"/>
+            <a:ext cx="5524500" cy="369332"/>
+          </a:xfrm>
+          <a:prstGeom prst="rect">
+            <a:avLst/>
+          </a:prstGeom>
+          <a:noFill/>
+        </p:spPr>
+        <p:txBody>
+          <a:bodyPr wrap="square" rtlCol="0">
+            <a:spAutoFit/>
+          </a:bodyPr>
+          <a:lstStyle/>
+          <a:p>
+            <a:r>
+              <a:rPr lang="en-US" dirty="0" smtClean="0"/>
+              <a:t>This is costumer attribute influencing tendency of default </a:t>
+            </a:r>
+            <a:endParaRPr lang="en-US" dirty="0"/>
+          </a:p>
+        </p:txBody>
+      </p:sp>
     </p:spTree>
     <p:extLst>
       <p:ext uri="{BB962C8B-B14F-4D97-AF65-F5344CB8AC3E}">
-        <p14:creationId xmlns:p14="http://schemas.microsoft.com/office/powerpoint/2010/main" val="3003464845"/>
+        <p14:creationId xmlns:p14="http://schemas.microsoft.com/office/powerpoint/2010/main" val="3759789253"/>
       </p:ext>
     </p:extLst>
   </p:cSld>
@@ -4365,20 +4368,9 @@
           <a:lstStyle/>
           <a:p>
             <a:r>
-              <a:rPr lang="en-US" b="1" dirty="0"/>
-              <a:t>Borrower grade </a:t>
-            </a:r>
-            <a:r>
-              <a:rPr lang="en-US" b="1" dirty="0" err="1"/>
-              <a:t>Vs</a:t>
-            </a:r>
-            <a:r>
-              <a:rPr lang="en-US" b="1" dirty="0"/>
-              <a:t> defaulters</a:t>
-            </a:r>
-            <a:br>
-              <a:rPr lang="en-US" b="1" dirty="0"/>
-            </a:br>
+              <a:rPr lang="en-US" b="1" dirty="0" smtClean="0"/>
+              <a:t>Borrower grade distribution across loan portfolio</a:t>
+            </a:r>
             <a:endParaRPr lang="en-US" b="1" dirty="0"/>
           </a:p>
         </p:txBody>
@@ -4401,96 +4393,18 @@
         </p:blipFill>
         <p:spPr>
           <a:xfrm>
-            <a:off x="838200" y="1972468"/>
-            <a:ext cx="5524500" cy="4314825"/>
+            <a:off x="1223962" y="2167731"/>
+            <a:ext cx="9744075" cy="3724275"/>
           </a:xfrm>
           <a:prstGeom prst="rect">
             <a:avLst/>
           </a:prstGeom>
         </p:spPr>
       </p:pic>
-      <p:sp>
-        <p:nvSpPr>
-          <p:cNvPr id="5" name="TextBox 4"/>
-          <p:cNvSpPr txBox="1"/>
-          <p:nvPr/>
-        </p:nvSpPr>
-        <p:spPr>
-          <a:xfrm>
-            <a:off x="7072313" y="1828800"/>
-            <a:ext cx="3943350" cy="3139321"/>
-          </a:xfrm>
-          <a:prstGeom prst="rect">
-            <a:avLst/>
-          </a:prstGeom>
-          <a:noFill/>
-        </p:spPr>
-        <p:txBody>
-          <a:bodyPr wrap="square" rtlCol="0">
-            <a:spAutoFit/>
-          </a:bodyPr>
-          <a:lstStyle/>
-          <a:p>
-            <a:r>
-              <a:rPr lang="en-US" dirty="0" smtClean="0"/>
-              <a:t>Data set is segmented based on loan status and grouped based on grade of borrowers</a:t>
-            </a:r>
-          </a:p>
-          <a:p>
-            <a:endParaRPr lang="en-US" dirty="0"/>
-          </a:p>
-          <a:p>
-            <a:r>
-              <a:rPr lang="en-US" dirty="0" smtClean="0"/>
-              <a:t>Largest group of defaulters are having grades B, C, D &amp; E</a:t>
-            </a:r>
-          </a:p>
-          <a:p>
-            <a:endParaRPr lang="en-US" dirty="0"/>
-          </a:p>
-          <a:p>
-            <a:r>
-              <a:rPr lang="en-US" dirty="0" smtClean="0"/>
-              <a:t>Giving above average grades (B to D) to borrowers without proper evaluation by loan agents for increasing business can be a reason for this</a:t>
-            </a:r>
-            <a:endParaRPr lang="en-US" dirty="0"/>
-          </a:p>
-        </p:txBody>
-      </p:sp>
-      <p:sp>
-        <p:nvSpPr>
-          <p:cNvPr id="6" name="TextBox 5"/>
-          <p:cNvSpPr txBox="1"/>
-          <p:nvPr/>
-        </p:nvSpPr>
-        <p:spPr>
-          <a:xfrm>
-            <a:off x="6496050" y="6029325"/>
-            <a:ext cx="5524500" cy="646331"/>
-          </a:xfrm>
-          <a:prstGeom prst="rect">
-            <a:avLst/>
-          </a:prstGeom>
-          <a:noFill/>
-        </p:spPr>
-        <p:txBody>
-          <a:bodyPr wrap="square" rtlCol="0">
-            <a:spAutoFit/>
-          </a:bodyPr>
-          <a:lstStyle/>
-          <a:p>
-            <a:r>
-              <a:rPr lang="en-US" dirty="0" smtClean="0"/>
-              <a:t>This is customer attribute but decided by lender, influencing tendency of default </a:t>
-            </a:r>
-            <a:endParaRPr lang="en-US" dirty="0"/>
-          </a:p>
-        </p:txBody>
-      </p:sp>
     </p:spTree>
     <p:extLst>
       <p:ext uri="{BB962C8B-B14F-4D97-AF65-F5344CB8AC3E}">
-        <p14:creationId xmlns:p14="http://schemas.microsoft.com/office/powerpoint/2010/main" val="192744776"/>
+        <p14:creationId xmlns:p14="http://schemas.microsoft.com/office/powerpoint/2010/main" val="3003464845"/>
       </p:ext>
     </p:extLst>
   </p:cSld>
@@ -4661,22 +4575,20 @@
         </p:nvSpPr>
         <p:spPr/>
         <p:txBody>
-          <a:bodyPr>
-            <a:normAutofit fontScale="90000"/>
-          </a:bodyPr>
+          <a:bodyPr/>
           <a:lstStyle/>
           <a:p>
             <a:r>
               <a:rPr lang="en-US" b="1" dirty="0"/>
-              <a:t>Borrower subgrade distribution for top 5 grades </a:t>
-            </a:r>
-            <a:r>
-              <a:rPr lang="en-US" b="1" dirty="0" smtClean="0"/>
-              <a:t>with maximum defaulters</a:t>
+              <a:t>Borrower grade </a:t>
+            </a:r>
+            <a:r>
+              <a:rPr lang="en-US" b="1" dirty="0" err="1"/>
+              <a:t>Vs</a:t>
             </a:r>
             <a:r>
               <a:rPr lang="en-US" b="1" dirty="0"/>
-              <a:t/>
+              <a:t> defaulters</a:t>
             </a:r>
             <a:br>
               <a:rPr lang="en-US" b="1" dirty="0"/>
@@ -4687,7 +4599,7 @@
       </p:sp>
       <p:pic>
         <p:nvPicPr>
-          <p:cNvPr id="5" name="Content Placeholder 4"/>
+          <p:cNvPr id="4" name="Content Placeholder 3"/>
           <p:cNvPicPr>
             <a:picLocks noGrp="1" noChangeAspect="1"/>
           </p:cNvPicPr>
@@ -4703,18 +4615,96 @@
         </p:blipFill>
         <p:spPr>
           <a:xfrm>
-            <a:off x="3065265" y="1690688"/>
-            <a:ext cx="6061470" cy="4351338"/>
+            <a:off x="838200" y="1972468"/>
+            <a:ext cx="5524500" cy="4314825"/>
           </a:xfrm>
           <a:prstGeom prst="rect">
             <a:avLst/>
           </a:prstGeom>
         </p:spPr>
       </p:pic>
+      <p:sp>
+        <p:nvSpPr>
+          <p:cNvPr id="5" name="TextBox 4"/>
+          <p:cNvSpPr txBox="1"/>
+          <p:nvPr/>
+        </p:nvSpPr>
+        <p:spPr>
+          <a:xfrm>
+            <a:off x="7072313" y="1828800"/>
+            <a:ext cx="3943350" cy="3139321"/>
+          </a:xfrm>
+          <a:prstGeom prst="rect">
+            <a:avLst/>
+          </a:prstGeom>
+          <a:noFill/>
+        </p:spPr>
+        <p:txBody>
+          <a:bodyPr wrap="square" rtlCol="0">
+            <a:spAutoFit/>
+          </a:bodyPr>
+          <a:lstStyle/>
+          <a:p>
+            <a:r>
+              <a:rPr lang="en-US" dirty="0" smtClean="0"/>
+              <a:t>Data set is segmented based on loan status and grouped based on grade of borrowers</a:t>
+            </a:r>
+          </a:p>
+          <a:p>
+            <a:endParaRPr lang="en-US" dirty="0"/>
+          </a:p>
+          <a:p>
+            <a:r>
+              <a:rPr lang="en-US" dirty="0" smtClean="0"/>
+              <a:t>Largest group of defaulters are having grades B, C, D &amp; E</a:t>
+            </a:r>
+          </a:p>
+          <a:p>
+            <a:endParaRPr lang="en-US" dirty="0"/>
+          </a:p>
+          <a:p>
+            <a:r>
+              <a:rPr lang="en-US" dirty="0" smtClean="0"/>
+              <a:t>Giving above average grades (B to D) to borrowers without proper evaluation by loan agents for increasing business can be a reason for this</a:t>
+            </a:r>
+            <a:endParaRPr lang="en-US" dirty="0"/>
+          </a:p>
+        </p:txBody>
+      </p:sp>
+      <p:sp>
+        <p:nvSpPr>
+          <p:cNvPr id="6" name="TextBox 5"/>
+          <p:cNvSpPr txBox="1"/>
+          <p:nvPr/>
+        </p:nvSpPr>
+        <p:spPr>
+          <a:xfrm>
+            <a:off x="6496050" y="6029325"/>
+            <a:ext cx="5524500" cy="646331"/>
+          </a:xfrm>
+          <a:prstGeom prst="rect">
+            <a:avLst/>
+          </a:prstGeom>
+          <a:noFill/>
+        </p:spPr>
+        <p:txBody>
+          <a:bodyPr wrap="square" rtlCol="0">
+            <a:spAutoFit/>
+          </a:bodyPr>
+          <a:lstStyle/>
+          <a:p>
+            <a:r>
+              <a:rPr lang="en-US" dirty="0" smtClean="0"/>
+              <a:t>This is customer attribute but decided by lender, influencing tendency of default </a:t>
+            </a:r>
+            <a:endParaRPr lang="en-US" dirty="0"/>
+          </a:p>
+        </p:txBody>
+      </p:sp>
     </p:spTree>
     <p:extLst>
       <p:ext uri="{BB962C8B-B14F-4D97-AF65-F5344CB8AC3E}">
-        <p14:creationId xmlns:p14="http://schemas.microsoft.com/office/powerpoint/2010/main" val="3393000003"/>
+        <p14:creationId xmlns:p14="http://schemas.microsoft.com/office/powerpoint/2010/main" val="192744776"/>
       </p:ext>
     </p:extLst>
   </p:cSld>
@@ -4753,24 +4743,22 @@
         </p:nvSpPr>
         <p:spPr/>
         <p:txBody>
-          <a:bodyPr/>
+          <a:bodyPr>
+            <a:normAutofit fontScale="90000"/>
+          </a:bodyPr>
           <a:lstStyle/>
           <a:p>
             <a:r>
               <a:rPr lang="en-US" b="1" dirty="0"/>
-              <a:t>Borrower </a:t>
+              <a:t>Borrower subgrade distribution for top 5 grades </a:t>
             </a:r>
             <a:r>
               <a:rPr lang="en-US" b="1" dirty="0" smtClean="0"/>
-              <a:t>verification status </a:t>
-            </a:r>
-            <a:r>
-              <a:rPr lang="en-US" b="1" dirty="0" err="1"/>
-              <a:t>Vs</a:t>
+              <a:t>with maximum defaulters</a:t>
             </a:r>
             <a:r>
               <a:rPr lang="en-US" b="1" dirty="0"/>
-              <a:t> defaulters</a:t>
+              <a:t/>
             </a:r>
             <a:br>
               <a:rPr lang="en-US" b="1" dirty="0"/>
@@ -4781,7 +4769,7 @@
       </p:sp>
       <p:pic>
         <p:nvPicPr>
-          <p:cNvPr id="4" name="Content Placeholder 3"/>
+          <p:cNvPr id="5" name="Content Placeholder 4"/>
           <p:cNvPicPr>
             <a:picLocks noGrp="1" noChangeAspect="1"/>
           </p:cNvPicPr>
@@ -4797,87 +4785,18 @@
         </p:blipFill>
         <p:spPr>
           <a:xfrm>
-            <a:off x="838200" y="2001044"/>
-            <a:ext cx="5524500" cy="4314825"/>
+            <a:off x="3065265" y="1690688"/>
+            <a:ext cx="6061470" cy="4351338"/>
           </a:xfrm>
           <a:prstGeom prst="rect">
             <a:avLst/>
           </a:prstGeom>
         </p:spPr>
       </p:pic>
-      <p:sp>
-        <p:nvSpPr>
-          <p:cNvPr id="5" name="TextBox 4"/>
-          <p:cNvSpPr txBox="1"/>
-          <p:nvPr/>
-        </p:nvSpPr>
-        <p:spPr>
-          <a:xfrm>
-            <a:off x="7158038" y="2001044"/>
-            <a:ext cx="3943350" cy="1754326"/>
-          </a:xfrm>
-          <a:prstGeom prst="rect">
-            <a:avLst/>
-          </a:prstGeom>
-          <a:noFill/>
-        </p:spPr>
-        <p:txBody>
-          <a:bodyPr wrap="square" rtlCol="0">
-            <a:spAutoFit/>
-          </a:bodyPr>
-          <a:lstStyle/>
-          <a:p>
-            <a:r>
-              <a:rPr lang="en-US" dirty="0" smtClean="0"/>
-              <a:t>Data set is segmented based on loan status and grouped based on verification status of borrowers.</a:t>
-            </a:r>
-          </a:p>
-          <a:p>
-            <a:endParaRPr lang="en-US" dirty="0" smtClean="0"/>
-          </a:p>
-          <a:p>
-            <a:r>
-              <a:rPr lang="en-US" dirty="0" smtClean="0"/>
-              <a:t>Majority of defaulters are either not verified or source not verified.</a:t>
-            </a:r>
-            <a:endParaRPr lang="en-US" dirty="0"/>
-          </a:p>
-        </p:txBody>
-      </p:sp>
-      <p:sp>
-        <p:nvSpPr>
-          <p:cNvPr id="6" name="TextBox 5"/>
-          <p:cNvSpPr txBox="1"/>
-          <p:nvPr/>
-        </p:nvSpPr>
-        <p:spPr>
-          <a:xfrm>
-            <a:off x="6824663" y="5992703"/>
-            <a:ext cx="5524500" cy="646331"/>
-          </a:xfrm>
-          <a:prstGeom prst="rect">
-            <a:avLst/>
-          </a:prstGeom>
-          <a:noFill/>
-        </p:spPr>
-        <p:txBody>
-          <a:bodyPr wrap="square" rtlCol="0">
-            <a:spAutoFit/>
-          </a:bodyPr>
-          <a:lstStyle/>
-          <a:p>
-            <a:r>
-              <a:rPr lang="en-US" dirty="0" smtClean="0"/>
-              <a:t>This is customer attribute but decided by lender, influencing tendency of default </a:t>
-            </a:r>
-            <a:endParaRPr lang="en-US" dirty="0"/>
-          </a:p>
-        </p:txBody>
-      </p:sp>
     </p:spTree>
     <p:extLst>
       <p:ext uri="{BB962C8B-B14F-4D97-AF65-F5344CB8AC3E}">
-        <p14:creationId xmlns:p14="http://schemas.microsoft.com/office/powerpoint/2010/main" val="1511126096"/>
+        <p14:creationId xmlns:p14="http://schemas.microsoft.com/office/powerpoint/2010/main" val="3393000003"/>
       </p:ext>
     </p:extLst>
   </p:cSld>
@@ -4916,53 +4835,41 @@
         </p:nvSpPr>
         <p:spPr/>
         <p:txBody>
-          <a:bodyPr>
-            <a:normAutofit fontScale="90000"/>
-          </a:bodyPr>
+          <a:bodyPr/>
           <a:lstStyle/>
           <a:p>
             <a:r>
               <a:rPr lang="en-US" b="1" dirty="0"/>
-              <a:t>Annual income </a:t>
+              <a:t>Borrower </a:t>
+            </a:r>
+            <a:r>
+              <a:rPr lang="en-US" b="1" dirty="0" smtClean="0"/>
+              <a:t>verification status </a:t>
             </a:r>
             <a:r>
               <a:rPr lang="en-US" b="1" dirty="0" err="1"/>
-              <a:t>V</a:t>
-            </a:r>
-            <a:r>
-              <a:rPr lang="en-US" b="1" dirty="0" err="1" smtClean="0"/>
-              <a:t>s</a:t>
-            </a:r>
-            <a:r>
-              <a:rPr lang="en-US" b="1" dirty="0" smtClean="0"/>
-              <a:t> </a:t>
+              <a:t>Vs</a:t>
             </a:r>
             <a:r>
               <a:rPr lang="en-US" b="1" dirty="0"/>
-              <a:t>employment </a:t>
-            </a:r>
-            <a:r>
-              <a:rPr lang="en-US" b="1" dirty="0" smtClean="0"/>
-              <a:t>length of all Borrowers</a:t>
-            </a:r>
-            <a:r>
-              <a:rPr lang="en-US" dirty="0"/>
-              <a:t/>
+              <a:t> defaulters</a:t>
             </a:r>
             <a:br>
-              <a:rPr lang="en-US" dirty="0"/>
+              <a:rPr lang="en-US" b="1" dirty="0"/>
             </a:br>
-            <a:endParaRPr lang="en-US" dirty="0"/>
+            <a:endParaRPr lang="en-US" b="1" dirty="0"/>
           </a:p>
         </p:txBody>
       </p:sp>
       <p:pic>
         <p:nvPicPr>
-          <p:cNvPr id="4" name="Picture 3"/>
+          <p:cNvPr id="4" name="Content Placeholder 3"/>
           <p:cNvPicPr>
-            <a:picLocks noChangeAspect="1"/>
+            <a:picLocks noGrp="1" noChangeAspect="1"/>
           </p:cNvPicPr>
-          <p:nvPr/>
+          <p:nvPr>
+            <p:ph idx="1"/>
+          </p:nvPr>
         </p:nvPicPr>
         <p:blipFill>
           <a:blip r:embed="rId2"/>
@@ -4972,8 +4879,8 @@
         </p:blipFill>
         <p:spPr>
           <a:xfrm>
-            <a:off x="1000127" y="1546851"/>
-            <a:ext cx="6348412" cy="4882526"/>
+            <a:off x="838200" y="2001044"/>
+            <a:ext cx="5524500" cy="4314825"/>
           </a:xfrm>
           <a:prstGeom prst="rect">
             <a:avLst/>
@@ -4988,8 +4895,8 @@
         </p:nvSpPr>
         <p:spPr>
           <a:xfrm>
-            <a:off x="8372475" y="1871663"/>
-            <a:ext cx="2814638" cy="1815882"/>
+            <a:off x="7158038" y="2001044"/>
+            <a:ext cx="3943350" cy="1754326"/>
           </a:xfrm>
           <a:prstGeom prst="rect">
             <a:avLst/>
@@ -5003,17 +4910,56 @@
           <a:lstStyle/>
           <a:p>
             <a:r>
-              <a:rPr lang="en-US" sz="2800" dirty="0" smtClean="0"/>
-              <a:t>Majority of borrowers have annual income     &lt; 10 lakhs</a:t>
-            </a:r>
-            <a:endParaRPr lang="en-US" sz="2800" dirty="0"/>
+              <a:rPr lang="en-US" dirty="0" smtClean="0"/>
+              <a:t>Data set is segmented based on loan status and grouped based on verification status of borrowers.</a:t>
+            </a:r>
+          </a:p>
+          <a:p>
+            <a:endParaRPr lang="en-US" dirty="0" smtClean="0"/>
+          </a:p>
+          <a:p>
+            <a:r>
+              <a:rPr lang="en-US" dirty="0" smtClean="0"/>
+              <a:t>Majority of defaulters are either not verified or source not verified.</a:t>
+            </a:r>
+            <a:endParaRPr lang="en-US" dirty="0"/>
+          </a:p>
+        </p:txBody>
+      </p:sp>
+      <p:sp>
+        <p:nvSpPr>
+          <p:cNvPr id="6" name="TextBox 5"/>
+          <p:cNvSpPr txBox="1"/>
+          <p:nvPr/>
+        </p:nvSpPr>
+        <p:spPr>
+          <a:xfrm>
+            <a:off x="6824663" y="5992703"/>
+            <a:ext cx="5524500" cy="646331"/>
+          </a:xfrm>
+          <a:prstGeom prst="rect">
+            <a:avLst/>
+          </a:prstGeom>
+          <a:noFill/>
+        </p:spPr>
+        <p:txBody>
+          <a:bodyPr wrap="square" rtlCol="0">
+            <a:spAutoFit/>
+          </a:bodyPr>
+          <a:lstStyle/>
+          <a:p>
+            <a:r>
+              <a:rPr lang="en-US" dirty="0" smtClean="0"/>
+              <a:t>This is customer attribute but decided by lender, influencing tendency of default </a:t>
+            </a:r>
+            <a:endParaRPr lang="en-US" dirty="0"/>
           </a:p>
         </p:txBody>
       </p:sp>
     </p:spTree>
     <p:extLst>
       <p:ext uri="{BB962C8B-B14F-4D97-AF65-F5344CB8AC3E}">
-        <p14:creationId xmlns:p14="http://schemas.microsoft.com/office/powerpoint/2010/main" val="943832351"/>
+        <p14:creationId xmlns:p14="http://schemas.microsoft.com/office/powerpoint/2010/main" val="1511126096"/>
       </p:ext>
     </p:extLst>
   </p:cSld>
@@ -5052,20 +4998,22 @@
         </p:nvSpPr>
         <p:spPr/>
         <p:txBody>
-          <a:bodyPr/>
-          <a:lstStyle/>
-          <a:p>
-            <a:r>
-              <a:rPr lang="en-US" b="1" dirty="0" smtClean="0"/>
-              <a:t>Employment </a:t>
-            </a:r>
+          <a:bodyPr>
+            <a:normAutofit fontScale="90000"/>
+          </a:bodyPr>
+          <a:lstStyle/>
+          <a:p>
             <a:r>
               <a:rPr lang="en-US" b="1" dirty="0"/>
-              <a:t>length </a:t>
-            </a:r>
-            <a:r>
-              <a:rPr lang="en-US" b="1" dirty="0" smtClean="0"/>
-              <a:t>of</a:t>
+              <a:t>Annual income </a:t>
+            </a:r>
+            <a:r>
+              <a:rPr lang="en-US" b="1" dirty="0" err="1"/>
+              <a:t>V</a:t>
+            </a:r>
+            <a:r>
+              <a:rPr lang="en-US" b="1" dirty="0" err="1" smtClean="0"/>
+              <a:t>s</a:t>
             </a:r>
             <a:r>
               <a:rPr lang="en-US" b="1" dirty="0" smtClean="0"/>
@@ -5073,24 +5021,30 @@
             </a:r>
             <a:r>
               <a:rPr lang="en-US" b="1" dirty="0"/>
-              <a:t>defaulters</a:t>
+              <a:t>employment </a:t>
+            </a:r>
+            <a:r>
+              <a:rPr lang="en-US" b="1" dirty="0" smtClean="0"/>
+              <a:t>length of all Borrowers</a:t>
+            </a:r>
+            <a:r>
+              <a:rPr lang="en-US" dirty="0"/>
+              <a:t/>
             </a:r>
             <a:br>
-              <a:rPr lang="en-US" b="1" dirty="0"/>
+              <a:rPr lang="en-US" dirty="0"/>
             </a:br>
-            <a:endParaRPr lang="en-US" b="1" dirty="0"/>
+            <a:endParaRPr lang="en-US" dirty="0"/>
           </a:p>
         </p:txBody>
       </p:sp>
       <p:pic>
         <p:nvPicPr>
-          <p:cNvPr id="4" name="Content Placeholder 3"/>
+          <p:cNvPr id="4" name="Picture 3"/>
           <p:cNvPicPr>
-            <a:picLocks noGrp="1" noChangeAspect="1"/>
+            <a:picLocks noChangeAspect="1"/>
           </p:cNvPicPr>
-          <p:nvPr>
-            <p:ph idx="1"/>
-          </p:nvPr>
+          <p:nvPr/>
         </p:nvPicPr>
         <p:blipFill>
           <a:blip r:embed="rId2"/>
@@ -5100,8 +5054,8 @@
         </p:blipFill>
         <p:spPr>
           <a:xfrm>
-            <a:off x="838200" y="1572418"/>
-            <a:ext cx="5524500" cy="4314825"/>
+            <a:off x="1000127" y="1546851"/>
+            <a:ext cx="6348412" cy="4882526"/>
           </a:xfrm>
           <a:prstGeom prst="rect">
             <a:avLst/>
@@ -5116,8 +5070,8 @@
         </p:nvSpPr>
         <p:spPr>
           <a:xfrm>
-            <a:off x="7072313" y="1828800"/>
-            <a:ext cx="3943350" cy="4247317"/>
+            <a:off x="8372475" y="1871663"/>
+            <a:ext cx="2814638" cy="1815882"/>
           </a:xfrm>
           <a:prstGeom prst="rect">
             <a:avLst/>
@@ -5131,78 +5085,17 @@
           <a:lstStyle/>
           <a:p>
             <a:r>
-              <a:rPr lang="en-US" dirty="0" smtClean="0"/>
-              <a:t>Data set is segmented based on loan status and grouped based on employment length of borrowers</a:t>
-            </a:r>
-          </a:p>
-          <a:p>
-            <a:endParaRPr lang="en-US" dirty="0" smtClean="0"/>
-          </a:p>
-          <a:p>
-            <a:endParaRPr lang="en-US" dirty="0"/>
-          </a:p>
-          <a:p>
-            <a:r>
-              <a:rPr lang="en-US" dirty="0" smtClean="0"/>
-              <a:t>Majority borrowers are employed for less than 5 years</a:t>
-            </a:r>
-          </a:p>
-          <a:p>
-            <a:endParaRPr lang="en-US" dirty="0"/>
-          </a:p>
-          <a:p>
-            <a:endParaRPr lang="en-US" dirty="0"/>
-          </a:p>
-          <a:p>
-            <a:r>
-              <a:rPr lang="en-US" dirty="0" smtClean="0"/>
-              <a:t>Largest single group of defaulters are employed for 10 or more years.</a:t>
-            </a:r>
-            <a:endParaRPr lang="en-US" dirty="0"/>
-          </a:p>
-          <a:p>
-            <a:r>
-              <a:rPr lang="en-US" dirty="0" smtClean="0"/>
-              <a:t>Filling high employment length without proper evaluation by loan agents for increasing business can be a reason for this.</a:t>
-            </a:r>
-            <a:endParaRPr lang="en-US" dirty="0"/>
-          </a:p>
-        </p:txBody>
-      </p:sp>
-      <p:sp>
-        <p:nvSpPr>
-          <p:cNvPr id="6" name="TextBox 5"/>
-          <p:cNvSpPr txBox="1"/>
-          <p:nvPr/>
-        </p:nvSpPr>
-        <p:spPr>
-          <a:xfrm>
-            <a:off x="938213" y="6076117"/>
-            <a:ext cx="5524500" cy="369332"/>
-          </a:xfrm>
-          <a:prstGeom prst="rect">
-            <a:avLst/>
-          </a:prstGeom>
-          <a:noFill/>
-        </p:spPr>
-        <p:txBody>
-          <a:bodyPr wrap="square" rtlCol="0">
-            <a:spAutoFit/>
-          </a:bodyPr>
-          <a:lstStyle/>
-          <a:p>
-            <a:r>
-              <a:rPr lang="en-US" dirty="0" smtClean="0"/>
-              <a:t>This is customer attribute influencing tendency of default </a:t>
-            </a:r>
-            <a:endParaRPr lang="en-US" dirty="0"/>
+              <a:rPr lang="en-US" sz="2800" dirty="0" smtClean="0"/>
+              <a:t>Majority of borrowers have annual income     &lt; 10 lakhs</a:t>
+            </a:r>
+            <a:endParaRPr lang="en-US" sz="2800" dirty="0"/>
           </a:p>
         </p:txBody>
       </p:sp>
     </p:spTree>
     <p:extLst>
       <p:ext uri="{BB962C8B-B14F-4D97-AF65-F5344CB8AC3E}">
-        <p14:creationId xmlns:p14="http://schemas.microsoft.com/office/powerpoint/2010/main" val="2656389933"/>
+        <p14:creationId xmlns:p14="http://schemas.microsoft.com/office/powerpoint/2010/main" val="943832351"/>
       </p:ext>
     </p:extLst>
   </p:cSld>
@@ -5239,39 +5132,43 @@
             <p:ph type="title"/>
           </p:nvPr>
         </p:nvSpPr>
-        <p:spPr>
-          <a:xfrm>
-            <a:off x="838200" y="107950"/>
-            <a:ext cx="10515600" cy="1004887"/>
-          </a:xfrm>
-        </p:spPr>
+        <p:spPr/>
         <p:txBody>
           <a:bodyPr/>
           <a:lstStyle/>
           <a:p>
             <a:r>
               <a:rPr lang="en-US" b="1" dirty="0" smtClean="0"/>
-              <a:t>Term of loan </a:t>
-            </a:r>
-            <a:r>
-              <a:rPr lang="en-US" b="1" dirty="0" err="1" smtClean="0"/>
-              <a:t>Vs</a:t>
+              <a:t>Employment </a:t>
+            </a:r>
+            <a:r>
+              <a:rPr lang="en-US" b="1" dirty="0"/>
+              <a:t>length </a:t>
             </a:r>
             <a:r>
               <a:rPr lang="en-US" b="1" dirty="0" smtClean="0"/>
-              <a:t> defaulters</a:t>
-            </a:r>
+              <a:t>of </a:t>
+            </a:r>
+            <a:r>
+              <a:rPr lang="en-US" b="1" dirty="0"/>
+              <a:t>defaulters</a:t>
+            </a:r>
+            <a:br>
+              <a:rPr lang="en-US" b="1" dirty="0"/>
+            </a:br>
             <a:endParaRPr lang="en-US" b="1" dirty="0"/>
           </a:p>
         </p:txBody>
       </p:sp>
       <p:pic>
         <p:nvPicPr>
-          <p:cNvPr id="4" name="Picture 3"/>
+          <p:cNvPr id="4" name="Content Placeholder 3"/>
           <p:cNvPicPr>
-            <a:picLocks noChangeAspect="1"/>
+            <a:picLocks noGrp="1" noChangeAspect="1"/>
           </p:cNvPicPr>
-          <p:nvPr/>
+          <p:nvPr>
+            <p:ph idx="1"/>
+          </p:nvPr>
         </p:nvPicPr>
         <p:blipFill>
           <a:blip r:embed="rId2"/>
@@ -5281,8 +5178,8 @@
         </p:blipFill>
         <p:spPr>
           <a:xfrm>
-            <a:off x="838200" y="1112837"/>
-            <a:ext cx="5757863" cy="6053897"/>
+            <a:off x="838200" y="1572418"/>
+            <a:ext cx="5524500" cy="4314825"/>
           </a:xfrm>
           <a:prstGeom prst="rect">
             <a:avLst/>
@@ -5291,14 +5188,14 @@
       </p:pic>
       <p:sp>
         <p:nvSpPr>
-          <p:cNvPr id="3" name="TextBox 2"/>
+          <p:cNvPr id="5" name="TextBox 4"/>
           <p:cNvSpPr txBox="1"/>
           <p:nvPr/>
         </p:nvSpPr>
         <p:spPr>
           <a:xfrm>
-            <a:off x="7829550" y="2571750"/>
-            <a:ext cx="3714750" cy="646331"/>
+            <a:off x="7072313" y="1828800"/>
+            <a:ext cx="3943350" cy="4247317"/>
           </a:xfrm>
           <a:prstGeom prst="rect">
             <a:avLst/>
@@ -5313,7 +5210,68 @@
           <a:p>
             <a:r>
               <a:rPr lang="en-US" dirty="0" smtClean="0"/>
-              <a:t>Short term loans (36 months) have more defaulting tendency</a:t>
+              <a:t>Data set is segmented based on loan status and grouped based on employment length of borrowers</a:t>
+            </a:r>
+          </a:p>
+          <a:p>
+            <a:endParaRPr lang="en-US" dirty="0" smtClean="0"/>
+          </a:p>
+          <a:p>
+            <a:endParaRPr lang="en-US" dirty="0"/>
+          </a:p>
+          <a:p>
+            <a:r>
+              <a:rPr lang="en-US" dirty="0" smtClean="0"/>
+              <a:t>Majority borrowers are employed for less than 5 years</a:t>
+            </a:r>
+          </a:p>
+          <a:p>
+            <a:endParaRPr lang="en-US" dirty="0"/>
+          </a:p>
+          <a:p>
+            <a:endParaRPr lang="en-US" dirty="0"/>
+          </a:p>
+          <a:p>
+            <a:r>
+              <a:rPr lang="en-US" dirty="0" smtClean="0"/>
+              <a:t>Largest single group of defaulters are employed for 10 or more years.</a:t>
+            </a:r>
+            <a:endParaRPr lang="en-US" dirty="0"/>
+          </a:p>
+          <a:p>
+            <a:r>
+              <a:rPr lang="en-US" dirty="0" smtClean="0"/>
+              <a:t>Filling high employment length without proper evaluation by loan agents for increasing business can be a reason for this.</a:t>
+            </a:r>
+            <a:endParaRPr lang="en-US" dirty="0"/>
+          </a:p>
+        </p:txBody>
+      </p:sp>
+      <p:sp>
+        <p:nvSpPr>
+          <p:cNvPr id="6" name="TextBox 5"/>
+          <p:cNvSpPr txBox="1"/>
+          <p:nvPr/>
+        </p:nvSpPr>
+        <p:spPr>
+          <a:xfrm>
+            <a:off x="938213" y="6076117"/>
+            <a:ext cx="5524500" cy="369332"/>
+          </a:xfrm>
+          <a:prstGeom prst="rect">
+            <a:avLst/>
+          </a:prstGeom>
+          <a:noFill/>
+        </p:spPr>
+        <p:txBody>
+          <a:bodyPr wrap="square" rtlCol="0">
+            <a:spAutoFit/>
+          </a:bodyPr>
+          <a:lstStyle/>
+          <a:p>
+            <a:r>
+              <a:rPr lang="en-US" dirty="0" smtClean="0"/>
+              <a:t>This is customer attribute influencing tendency of default </a:t>
             </a:r>
             <a:endParaRPr lang="en-US" dirty="0"/>
           </a:p>
@@ -5322,7 +5280,7 @@
     </p:spTree>
     <p:extLst>
       <p:ext uri="{BB962C8B-B14F-4D97-AF65-F5344CB8AC3E}">
-        <p14:creationId xmlns:p14="http://schemas.microsoft.com/office/powerpoint/2010/main" val="3180361206"/>
+        <p14:creationId xmlns:p14="http://schemas.microsoft.com/office/powerpoint/2010/main" val="2656389933"/>
       </p:ext>
     </p:extLst>
   </p:cSld>
@@ -5359,14 +5317,19 @@
             <p:ph type="title"/>
           </p:nvPr>
         </p:nvSpPr>
-        <p:spPr/>
+        <p:spPr>
+          <a:xfrm>
+            <a:off x="838200" y="107950"/>
+            <a:ext cx="10515600" cy="1004887"/>
+          </a:xfrm>
+        </p:spPr>
         <p:txBody>
           <a:bodyPr/>
           <a:lstStyle/>
           <a:p>
             <a:r>
               <a:rPr lang="en-US" b="1" dirty="0" smtClean="0"/>
-              <a:t>Interest Rate </a:t>
+              <a:t>Term of loan </a:t>
             </a:r>
             <a:r>
               <a:rPr lang="en-US" b="1" dirty="0" err="1" smtClean="0"/>
@@ -5374,7 +5337,7 @@
             </a:r>
             <a:r>
               <a:rPr lang="en-US" b="1" dirty="0" smtClean="0"/>
-              <a:t> Defaulters</a:t>
+              <a:t> defaulters</a:t>
             </a:r>
             <a:endParaRPr lang="en-US" b="1" dirty="0"/>
           </a:p>
@@ -5396,6 +5359,121 @@
         </p:blipFill>
         <p:spPr>
           <a:xfrm>
+            <a:off x="838200" y="1112837"/>
+            <a:ext cx="5757863" cy="6053897"/>
+          </a:xfrm>
+          <a:prstGeom prst="rect">
+            <a:avLst/>
+          </a:prstGeom>
+        </p:spPr>
+      </p:pic>
+      <p:sp>
+        <p:nvSpPr>
+          <p:cNvPr id="3" name="TextBox 2"/>
+          <p:cNvSpPr txBox="1"/>
+          <p:nvPr/>
+        </p:nvSpPr>
+        <p:spPr>
+          <a:xfrm>
+            <a:off x="7829550" y="2571750"/>
+            <a:ext cx="3714750" cy="646331"/>
+          </a:xfrm>
+          <a:prstGeom prst="rect">
+            <a:avLst/>
+          </a:prstGeom>
+          <a:noFill/>
+        </p:spPr>
+        <p:txBody>
+          <a:bodyPr wrap="square" rtlCol="0">
+            <a:spAutoFit/>
+          </a:bodyPr>
+          <a:lstStyle/>
+          <a:p>
+            <a:r>
+              <a:rPr lang="en-US" dirty="0" smtClean="0"/>
+              <a:t>Short term loans (36 months) have more defaulting tendency</a:t>
+            </a:r>
+            <a:endParaRPr lang="en-US" dirty="0"/>
+          </a:p>
+        </p:txBody>
+      </p:sp>
+    </p:spTree>
+    <p:extLst>
+      <p:ext uri="{BB962C8B-B14F-4D97-AF65-F5344CB8AC3E}">
+        <p14:creationId xmlns:p14="http://schemas.microsoft.com/office/powerpoint/2010/main" val="3180361206"/>
+      </p:ext>
+    </p:extLst>
+  </p:cSld>
+  <p:clrMapOvr>
+    <a:masterClrMapping/>
+  </p:clrMapOvr>
+</p:sld>
+</file>
+
+<file path=ppt/slides/slide26.xml><?xml version="1.0" encoding="utf-8"?>
+<p:sld xmlns:a="http://schemas.openxmlformats.org/drawingml/2006/main" xmlns:r="http://schemas.openxmlformats.org/officeDocument/2006/relationships" xmlns:p="http://schemas.openxmlformats.org/presentationml/2006/main">
+  <p:cSld>
+    <p:spTree>
+      <p:nvGrpSpPr>
+        <p:cNvPr id="1" name=""/>
+        <p:cNvGrpSpPr/>
+        <p:nvPr/>
+      </p:nvGrpSpPr>
+      <p:grpSpPr>
+        <a:xfrm>
+          <a:off x="0" y="0"/>
+          <a:ext cx="0" cy="0"/>
+          <a:chOff x="0" y="0"/>
+          <a:chExt cx="0" cy="0"/>
+        </a:xfrm>
+      </p:grpSpPr>
+      <p:sp>
+        <p:nvSpPr>
+          <p:cNvPr id="2" name="Title 1"/>
+          <p:cNvSpPr>
+            <a:spLocks noGrp="1"/>
+          </p:cNvSpPr>
+          <p:nvPr>
+            <p:ph type="title"/>
+          </p:nvPr>
+        </p:nvSpPr>
+        <p:spPr/>
+        <p:txBody>
+          <a:bodyPr/>
+          <a:lstStyle/>
+          <a:p>
+            <a:r>
+              <a:rPr lang="en-US" b="1" dirty="0" smtClean="0"/>
+              <a:t>Interest Rate </a:t>
+            </a:r>
+            <a:r>
+              <a:rPr lang="en-US" b="1" dirty="0" err="1" smtClean="0"/>
+              <a:t>Vs</a:t>
+            </a:r>
+            <a:r>
+              <a:rPr lang="en-US" b="1" dirty="0" smtClean="0"/>
+              <a:t> Defaulters</a:t>
+            </a:r>
+            <a:endParaRPr lang="en-US" b="1" dirty="0"/>
+          </a:p>
+        </p:txBody>
+      </p:sp>
+      <p:pic>
+        <p:nvPicPr>
+          <p:cNvPr id="4" name="Picture 3"/>
+          <p:cNvPicPr>
+            <a:picLocks noChangeAspect="1"/>
+          </p:cNvPicPr>
+          <p:nvPr/>
+        </p:nvPicPr>
+        <p:blipFill>
+          <a:blip r:embed="rId2"/>
+          <a:stretch>
+            <a:fillRect/>
+          </a:stretch>
+        </p:blipFill>
+        <p:spPr>
+          <a:xfrm>
             <a:off x="471487" y="2009775"/>
             <a:ext cx="8279324" cy="3205164"/>
           </a:xfrm>
@@ -5447,7 +5525,7 @@
 </p:sld>
 </file>
 
-<file path=ppt/slides/slide26.xml><?xml version="1.0" encoding="utf-8"?>
+<file path=ppt/slides/slide27.xml><?xml version="1.0" encoding="utf-8"?>
 <p:sld xmlns:a="http://schemas.openxmlformats.org/drawingml/2006/main" xmlns:r="http://schemas.openxmlformats.org/officeDocument/2006/relationships" xmlns:p="http://schemas.openxmlformats.org/presentationml/2006/main">
   <p:cSld>
     <p:spTree>
@@ -6288,15 +6366,7 @@
           <a:p>
             <a:r>
               <a:rPr lang="en-US" dirty="0" smtClean="0"/>
-              <a:t>This is </a:t>
-            </a:r>
-            <a:r>
-              <a:rPr lang="en-US" dirty="0" smtClean="0"/>
-              <a:t>customer attribute </a:t>
-            </a:r>
-            <a:r>
-              <a:rPr lang="en-US" dirty="0" smtClean="0"/>
-              <a:t>influencing tendency of default </a:t>
+              <a:t>This is customer attribute influencing tendency of default </a:t>
             </a:r>
             <a:endParaRPr lang="en-US" dirty="0"/>
           </a:p>

</xml_diff>